<commit_message>
continuing work in intro to kanban slides. working on lean tools slides
</commit_message>
<xml_diff>
--- a/Getting Started With Kanban In Software Engineering/Getting Started With Kanban.pptx
+++ b/Getting Started With Kanban In Software Engineering/Getting Started With Kanban.pptx
@@ -5,7 +5,7 @@
     <p:sldMasterId id="2147483648" r:id="rId1"/>
   </p:sldMasterIdLst>
   <p:notesMasterIdLst>
-    <p:notesMasterId r:id="rId25"/>
+    <p:notesMasterId r:id="rId26"/>
   </p:notesMasterIdLst>
   <p:sldIdLst>
     <p:sldId id="256" r:id="rId2"/>
@@ -25,12 +25,13 @@
     <p:sldId id="279" r:id="rId16"/>
     <p:sldId id="278" r:id="rId17"/>
     <p:sldId id="277" r:id="rId18"/>
-    <p:sldId id="264" r:id="rId19"/>
-    <p:sldId id="261" r:id="rId20"/>
-    <p:sldId id="258" r:id="rId21"/>
-    <p:sldId id="262" r:id="rId22"/>
-    <p:sldId id="263" r:id="rId23"/>
-    <p:sldId id="281" r:id="rId24"/>
+    <p:sldId id="282" r:id="rId19"/>
+    <p:sldId id="264" r:id="rId20"/>
+    <p:sldId id="261" r:id="rId21"/>
+    <p:sldId id="258" r:id="rId22"/>
+    <p:sldId id="262" r:id="rId23"/>
+    <p:sldId id="263" r:id="rId24"/>
+    <p:sldId id="281" r:id="rId25"/>
   </p:sldIdLst>
   <p:sldSz cx="9144000" cy="6858000" type="screen4x3"/>
   <p:notesSz cx="6858000" cy="9144000"/>
@@ -1144,11 +1145,7 @@
             </a:r>
             <a:r>
               <a:rPr lang="en-US" baseline="0" dirty="0" smtClean="0"/>
-              <a:t> work items to balance flow of value and </a:t>
-            </a:r>
-            <a:r>
-              <a:rPr lang="en-US" baseline="0" smtClean="0"/>
-              <a:t>increase feedback</a:t>
+              <a:t> work items to balance flow of value and increase feedback</a:t>
             </a:r>
           </a:p>
           <a:p>
@@ -1239,6 +1236,36 @@
           </a:bodyPr>
           <a:lstStyle/>
           <a:p>
+            <a:r>
+              <a:rPr lang="en-US" dirty="0" err="1" smtClean="0"/>
+              <a:t>Andon</a:t>
+            </a:r>
+            <a:r>
+              <a:rPr lang="en-US" baseline="0" dirty="0" smtClean="0"/>
+              <a:t> – stop the line when an error is found.</a:t>
+            </a:r>
+          </a:p>
+          <a:p>
+            <a:r>
+              <a:rPr lang="en-US" baseline="0" dirty="0" err="1" smtClean="0"/>
+              <a:t>Jidoka</a:t>
+            </a:r>
+            <a:r>
+              <a:rPr lang="en-US" baseline="0" dirty="0" smtClean="0"/>
+              <a:t> – </a:t>
+            </a:r>
+            <a:r>
+              <a:rPr lang="en-US" baseline="0" dirty="0" err="1" smtClean="0"/>
+              <a:t>autonomation</a:t>
+            </a:r>
+            <a:r>
+              <a:rPr lang="en-US" baseline="0" dirty="0" smtClean="0"/>
+              <a:t>. Automation with a human touch. Stop and fix it now. </a:t>
+            </a:r>
+            <a:r>
+              <a:rPr lang="en-US" baseline="0" dirty="0" smtClean="0"/>
+              <a:t>CI and broken builds. Big flashing lights, etc.</a:t>
+            </a:r>
             <a:endParaRPr lang="en-US" dirty="0"/>
           </a:p>
         </p:txBody>
@@ -1326,6 +1353,34 @@
           </a:bodyPr>
           <a:lstStyle/>
           <a:p>
+            <a:r>
+              <a:rPr lang="en-US" dirty="0" smtClean="0"/>
+              <a:t>Root cause analysis: 5 why’s</a:t>
+            </a:r>
+          </a:p>
+          <a:p>
+            <a:r>
+              <a:rPr lang="en-US" dirty="0" smtClean="0"/>
+              <a:t>Not who, but why</a:t>
+            </a:r>
+          </a:p>
+          <a:p>
+            <a:r>
+              <a:rPr lang="en-US" dirty="0" err="1" smtClean="0"/>
+              <a:t>Poka</a:t>
+            </a:r>
+            <a:r>
+              <a:rPr lang="en-US" dirty="0" smtClean="0"/>
+              <a:t>-Yoke</a:t>
+            </a:r>
+            <a:r>
+              <a:rPr lang="en-US" baseline="0" dirty="0" smtClean="0"/>
+              <a:t> - </a:t>
+            </a:r>
+            <a:r>
+              <a:rPr lang="en-US" dirty="0" smtClean="0"/>
+              <a:t>Mistake proofing: put in measures to prevent the problem in the future</a:t>
+            </a:r>
             <a:endParaRPr lang="en-US" dirty="0"/>
           </a:p>
         </p:txBody>
@@ -1413,7 +1468,34 @@
           </a:bodyPr>
           <a:lstStyle/>
           <a:p>
-            <a:endParaRPr lang="en-US" dirty="0"/>
+            <a:r>
+              <a:rPr lang="en-US" dirty="0" smtClean="0"/>
+              <a:t>PDCA: plan do check act</a:t>
+            </a:r>
+          </a:p>
+          <a:p>
+            <a:r>
+              <a:rPr lang="en-US" dirty="0" smtClean="0"/>
+              <a:t>Process improvement</a:t>
+            </a:r>
+            <a:endParaRPr lang="en-US" b="0" dirty="0" smtClean="0"/>
+          </a:p>
+          <a:p>
+            <a:r>
+              <a:rPr lang="en-US" b="0" dirty="0" smtClean="0"/>
+              <a:t>Kaizen: Continuous</a:t>
+            </a:r>
+            <a:r>
+              <a:rPr lang="en-US" b="0" baseline="0" dirty="0" smtClean="0"/>
+              <a:t> improvement</a:t>
+            </a:r>
+          </a:p>
+          <a:p>
+            <a:r>
+              <a:rPr lang="en-US" b="0" baseline="0" dirty="0" smtClean="0"/>
+              <a:t>Like peeling an onion that never ends</a:t>
+            </a:r>
+            <a:endParaRPr lang="en-US" b="0" dirty="0"/>
           </a:p>
         </p:txBody>
       </p:sp>
@@ -1500,10 +1582,6 @@
           </a:bodyPr>
           <a:lstStyle/>
           <a:p>
-            <a:r>
-              <a:rPr lang="en-US" dirty="0" smtClean="0"/>
-              <a:t>Visualize your process</a:t>
-            </a:r>
             <a:endParaRPr lang="en-US" dirty="0"/>
           </a:p>
         </p:txBody>
@@ -1531,7 +1609,7 @@
               <a:pPr>
                 <a:defRPr/>
               </a:pPr>
-              <a:t>19</a:t>
+              <a:t>18</a:t>
             </a:fld>
             <a:endParaRPr lang="en-US"/>
           </a:p>
@@ -1593,7 +1671,7 @@
           <a:p>
             <a:r>
               <a:rPr lang="en-US" dirty="0" smtClean="0"/>
-              <a:t>Limit work in process</a:t>
+              <a:t>Visualize your process</a:t>
             </a:r>
             <a:endParaRPr lang="en-US" dirty="0"/>
           </a:p>
@@ -1815,7 +1893,7 @@
           <a:p>
             <a:r>
               <a:rPr lang="en-US" dirty="0" smtClean="0"/>
-              <a:t>Pull, don’t push</a:t>
+              <a:t>Limit work in process</a:t>
             </a:r>
             <a:endParaRPr lang="en-US" dirty="0"/>
           </a:p>
@@ -1906,7 +1984,7 @@
           <a:p>
             <a:r>
               <a:rPr lang="en-US" dirty="0" smtClean="0"/>
-              <a:t>Monitor and improve</a:t>
+              <a:t>Pull, don’t push</a:t>
             </a:r>
             <a:endParaRPr lang="en-US" dirty="0"/>
           </a:p>
@@ -1997,7 +2075,7 @@
           <a:p>
             <a:r>
               <a:rPr lang="en-US" dirty="0" smtClean="0"/>
-              <a:t>Kanban as a change management system</a:t>
+              <a:t>Monitor and improve</a:t>
             </a:r>
             <a:endParaRPr lang="en-US" dirty="0"/>
           </a:p>
@@ -2027,6 +2105,97 @@
                 <a:defRPr/>
               </a:pPr>
               <a:t>23</a:t>
+            </a:fld>
+            <a:endParaRPr lang="en-US"/>
+          </a:p>
+        </p:txBody>
+      </p:sp>
+    </p:spTree>
+  </p:cSld>
+  <p:clrMapOvr>
+    <a:masterClrMapping/>
+  </p:clrMapOvr>
+</p:notes>
+</file>
+
+<file path=ppt/notesSlides/notesSlide23.xml><?xml version="1.0" encoding="utf-8"?>
+<p:notes xmlns:a="http://schemas.openxmlformats.org/drawingml/2006/main" xmlns:r="http://schemas.openxmlformats.org/officeDocument/2006/relationships" xmlns:p="http://schemas.openxmlformats.org/presentationml/2006/main">
+  <p:cSld>
+    <p:spTree>
+      <p:nvGrpSpPr>
+        <p:cNvPr id="1" name=""/>
+        <p:cNvGrpSpPr/>
+        <p:nvPr/>
+      </p:nvGrpSpPr>
+      <p:grpSpPr>
+        <a:xfrm>
+          <a:off x="0" y="0"/>
+          <a:ext cx="0" cy="0"/>
+          <a:chOff x="0" y="0"/>
+          <a:chExt cx="0" cy="0"/>
+        </a:xfrm>
+      </p:grpSpPr>
+      <p:sp>
+        <p:nvSpPr>
+          <p:cNvPr id="2" name="Slide Image Placeholder 1"/>
+          <p:cNvSpPr>
+            <a:spLocks noGrp="1" noRot="1" noChangeAspect="1"/>
+          </p:cNvSpPr>
+          <p:nvPr>
+            <p:ph type="sldImg"/>
+          </p:nvPr>
+        </p:nvSpPr>
+        <p:spPr/>
+      </p:sp>
+      <p:sp>
+        <p:nvSpPr>
+          <p:cNvPr id="3" name="Notes Placeholder 2"/>
+          <p:cNvSpPr>
+            <a:spLocks noGrp="1"/>
+          </p:cNvSpPr>
+          <p:nvPr>
+            <p:ph type="body" idx="1"/>
+          </p:nvPr>
+        </p:nvSpPr>
+        <p:spPr/>
+        <p:txBody>
+          <a:bodyPr>
+            <a:normAutofit/>
+          </a:bodyPr>
+          <a:lstStyle/>
+          <a:p>
+            <a:r>
+              <a:rPr lang="en-US" dirty="0" smtClean="0"/>
+              <a:t>Kanban as a change management system</a:t>
+            </a:r>
+            <a:endParaRPr lang="en-US" dirty="0"/>
+          </a:p>
+        </p:txBody>
+      </p:sp>
+      <p:sp>
+        <p:nvSpPr>
+          <p:cNvPr id="4" name="Slide Number Placeholder 3"/>
+          <p:cNvSpPr>
+            <a:spLocks noGrp="1"/>
+          </p:cNvSpPr>
+          <p:nvPr>
+            <p:ph type="sldNum" sz="quarter" idx="10"/>
+          </p:nvPr>
+        </p:nvSpPr>
+        <p:spPr/>
+        <p:txBody>
+          <a:bodyPr/>
+          <a:lstStyle/>
+          <a:p>
+            <a:pPr>
+              <a:defRPr/>
+            </a:pPr>
+            <a:fld id="{9A28354E-8592-4F48-AFD2-064796838083}" type="slidenum">
+              <a:rPr lang="en-US" smtClean="0"/>
+              <a:pPr>
+                <a:defRPr/>
+              </a:pPr>
+              <a:t>24</a:t>
             </a:fld>
             <a:endParaRPr lang="en-US"/>
           </a:p>
@@ -7281,7 +7450,7 @@
       </p:grpSpPr>
       <p:pic>
         <p:nvPicPr>
-          <p:cNvPr id="3" name="Picture 2"/>
+          <p:cNvPr id="8" name="Picture 4"/>
           <p:cNvPicPr>
             <a:picLocks noChangeAspect="1" noChangeArrowheads="1"/>
           </p:cNvPicPr>
@@ -7296,8 +7465,8 @@
         </p:blipFill>
         <p:spPr bwMode="auto">
           <a:xfrm>
-            <a:off x="990601" y="1044542"/>
-            <a:ext cx="7162799" cy="4768916"/>
+            <a:off x="990600" y="800100"/>
+            <a:ext cx="7162800" cy="5257800"/>
           </a:xfrm>
           <a:prstGeom prst="roundRect">
             <a:avLst/>
@@ -7337,6 +7506,41 @@
           <a:chExt cx="0" cy="0"/>
         </a:xfrm>
       </p:grpSpPr>
+      <p:pic>
+        <p:nvPicPr>
+          <p:cNvPr id="41987" name="Picture 3"/>
+          <p:cNvPicPr>
+            <a:picLocks noChangeAspect="1" noChangeArrowheads="1"/>
+          </p:cNvPicPr>
+          <p:nvPr/>
+        </p:nvPicPr>
+        <p:blipFill>
+          <a:blip r:embed="rId3"/>
+          <a:srcRect l="-39245" r="-39245"/>
+          <a:stretch>
+            <a:fillRect/>
+          </a:stretch>
+        </p:blipFill>
+        <p:spPr bwMode="auto">
+          <a:xfrm>
+            <a:off x="982704" y="1026064"/>
+            <a:ext cx="7178592" cy="4805872"/>
+          </a:xfrm>
+          <a:prstGeom prst="roundRect">
+            <a:avLst/>
+          </a:prstGeom>
+          <a:solidFill>
+            <a:schemeClr val="bg1"/>
+          </a:solidFill>
+          <a:ln w="9525">
+            <a:noFill/>
+            <a:miter lim="800000"/>
+            <a:headEnd/>
+            <a:tailEnd/>
+          </a:ln>
+          <a:effectLst/>
+        </p:spPr>
+      </p:pic>
     </p:spTree>
   </p:cSld>
   <p:clrMapOvr>
@@ -7362,6 +7566,39 @@
           <a:chExt cx="0" cy="0"/>
         </a:xfrm>
       </p:grpSpPr>
+      <p:pic>
+        <p:nvPicPr>
+          <p:cNvPr id="3" name="Picture 2"/>
+          <p:cNvPicPr>
+            <a:picLocks noChangeAspect="1" noChangeArrowheads="1"/>
+          </p:cNvPicPr>
+          <p:nvPr/>
+        </p:nvPicPr>
+        <p:blipFill>
+          <a:blip r:embed="rId3"/>
+          <a:srcRect/>
+          <a:stretch>
+            <a:fillRect/>
+          </a:stretch>
+        </p:blipFill>
+        <p:spPr bwMode="auto">
+          <a:xfrm>
+            <a:off x="952500" y="1485900"/>
+            <a:ext cx="7239000" cy="3886200"/>
+          </a:xfrm>
+          <a:prstGeom prst="roundRect">
+            <a:avLst/>
+          </a:prstGeom>
+          <a:noFill/>
+          <a:ln w="9525">
+            <a:noFill/>
+            <a:miter lim="800000"/>
+            <a:headEnd/>
+            <a:tailEnd/>
+          </a:ln>
+          <a:effectLst/>
+        </p:spPr>
+      </p:pic>
     </p:spTree>
   </p:cSld>
   <p:clrMapOvr>
@@ -7387,6 +7624,39 @@
           <a:chExt cx="0" cy="0"/>
         </a:xfrm>
       </p:grpSpPr>
+      <p:pic>
+        <p:nvPicPr>
+          <p:cNvPr id="3" name="Picture 2"/>
+          <p:cNvPicPr>
+            <a:picLocks noChangeAspect="1" noChangeArrowheads="1"/>
+          </p:cNvPicPr>
+          <p:nvPr/>
+        </p:nvPicPr>
+        <p:blipFill>
+          <a:blip r:embed="rId3"/>
+          <a:srcRect/>
+          <a:stretch>
+            <a:fillRect/>
+          </a:stretch>
+        </p:blipFill>
+        <p:spPr bwMode="auto">
+          <a:xfrm>
+            <a:off x="990600" y="1044542"/>
+            <a:ext cx="7162800" cy="4768917"/>
+          </a:xfrm>
+          <a:prstGeom prst="roundRect">
+            <a:avLst/>
+          </a:prstGeom>
+          <a:noFill/>
+          <a:ln w="9525">
+            <a:noFill/>
+            <a:miter lim="800000"/>
+            <a:headEnd/>
+            <a:tailEnd/>
+          </a:ln>
+          <a:effectLst/>
+        </p:spPr>
+      </p:pic>
     </p:spTree>
   </p:cSld>
   <p:clrMapOvr>
@@ -7412,81 +7682,6 @@
           <a:chExt cx="0" cy="0"/>
         </a:xfrm>
       </p:grpSpPr>
-      <p:sp>
-        <p:nvSpPr>
-          <p:cNvPr id="11266" name="TextBox 3"/>
-          <p:cNvSpPr txBox="1">
-            <a:spLocks noChangeArrowheads="1"/>
-          </p:cNvSpPr>
-          <p:nvPr/>
-        </p:nvSpPr>
-        <p:spPr bwMode="auto">
-          <a:xfrm>
-            <a:off x="1622425" y="95250"/>
-            <a:ext cx="5899150" cy="1200150"/>
-          </a:xfrm>
-          <a:prstGeom prst="rect">
-            <a:avLst/>
-          </a:prstGeom>
-          <a:noFill/>
-          <a:ln w="9525">
-            <a:noFill/>
-            <a:miter lim="800000"/>
-            <a:headEnd/>
-            <a:tailEnd/>
-          </a:ln>
-        </p:spPr>
-        <p:txBody>
-          <a:bodyPr wrap="none">
-            <a:spAutoFit/>
-          </a:bodyPr>
-          <a:lstStyle/>
-          <a:p>
-            <a:r>
-              <a:rPr lang="en-US" sz="7200" dirty="0">
-                <a:solidFill>
-                  <a:schemeClr val="bg1"/>
-                </a:solidFill>
-                <a:latin typeface="Calibri" pitchFamily="34" charset="0"/>
-              </a:rPr>
-              <a:t>Getting Started</a:t>
-            </a:r>
-          </a:p>
-        </p:txBody>
-      </p:sp>
-      <p:pic>
-        <p:nvPicPr>
-          <p:cNvPr id="6147" name="Picture 3"/>
-          <p:cNvPicPr>
-            <a:picLocks noChangeAspect="1" noChangeArrowheads="1"/>
-          </p:cNvPicPr>
-          <p:nvPr/>
-        </p:nvPicPr>
-        <p:blipFill>
-          <a:blip r:embed="rId2"/>
-          <a:srcRect/>
-          <a:stretch>
-            <a:fillRect/>
-          </a:stretch>
-        </p:blipFill>
-        <p:spPr bwMode="auto">
-          <a:xfrm>
-            <a:off x="987890" y="1552074"/>
-            <a:ext cx="7168220" cy="4772526"/>
-          </a:xfrm>
-          <a:prstGeom prst="roundRect">
-            <a:avLst/>
-          </a:prstGeom>
-          <a:noFill/>
-          <a:ln w="9525">
-            <a:noFill/>
-            <a:miter lim="800000"/>
-            <a:headEnd/>
-            <a:tailEnd/>
-          </a:ln>
-          <a:effectLst/>
-        </p:spPr>
-      </p:pic>
     </p:spTree>
   </p:cSld>
   <p:clrMapOvr>
@@ -7512,16 +7707,58 @@
           <a:chExt cx="0" cy="0"/>
         </a:xfrm>
       </p:grpSpPr>
+      <p:sp>
+        <p:nvSpPr>
+          <p:cNvPr id="11266" name="TextBox 3"/>
+          <p:cNvSpPr txBox="1">
+            <a:spLocks noChangeArrowheads="1"/>
+          </p:cNvSpPr>
+          <p:nvPr/>
+        </p:nvSpPr>
+        <p:spPr bwMode="auto">
+          <a:xfrm>
+            <a:off x="1622425" y="95250"/>
+            <a:ext cx="5899150" cy="1200150"/>
+          </a:xfrm>
+          <a:prstGeom prst="rect">
+            <a:avLst/>
+          </a:prstGeom>
+          <a:noFill/>
+          <a:ln w="9525">
+            <a:noFill/>
+            <a:miter lim="800000"/>
+            <a:headEnd/>
+            <a:tailEnd/>
+          </a:ln>
+        </p:spPr>
+        <p:txBody>
+          <a:bodyPr wrap="none">
+            <a:spAutoFit/>
+          </a:bodyPr>
+          <a:lstStyle/>
+          <a:p>
+            <a:r>
+              <a:rPr lang="en-US" sz="7200" dirty="0">
+                <a:solidFill>
+                  <a:schemeClr val="bg1"/>
+                </a:solidFill>
+                <a:latin typeface="Calibri" pitchFamily="34" charset="0"/>
+              </a:rPr>
+              <a:t>Getting Started</a:t>
+            </a:r>
+          </a:p>
+        </p:txBody>
+      </p:sp>
       <p:pic>
         <p:nvPicPr>
-          <p:cNvPr id="6146" name="Picture 2"/>
+          <p:cNvPr id="6147" name="Picture 3"/>
           <p:cNvPicPr>
             <a:picLocks noChangeAspect="1" noChangeArrowheads="1"/>
           </p:cNvPicPr>
           <p:nvPr/>
         </p:nvPicPr>
         <p:blipFill>
-          <a:blip r:embed="rId3"/>
+          <a:blip r:embed="rId2"/>
           <a:srcRect/>
           <a:stretch>
             <a:fillRect/>
@@ -7529,8 +7766,8 @@
         </p:blipFill>
         <p:spPr bwMode="auto">
           <a:xfrm>
-            <a:off x="952500" y="714375"/>
-            <a:ext cx="7239000" cy="5429251"/>
+            <a:off x="987890" y="1552074"/>
+            <a:ext cx="7168220" cy="4772526"/>
           </a:xfrm>
           <a:prstGeom prst="roundRect">
             <a:avLst/>
@@ -7630,6 +7867,64 @@
       </p:grpSpPr>
       <p:pic>
         <p:nvPicPr>
+          <p:cNvPr id="6146" name="Picture 2"/>
+          <p:cNvPicPr>
+            <a:picLocks noChangeAspect="1" noChangeArrowheads="1"/>
+          </p:cNvPicPr>
+          <p:nvPr/>
+        </p:nvPicPr>
+        <p:blipFill>
+          <a:blip r:embed="rId3"/>
+          <a:srcRect/>
+          <a:stretch>
+            <a:fillRect/>
+          </a:stretch>
+        </p:blipFill>
+        <p:spPr bwMode="auto">
+          <a:xfrm>
+            <a:off x="952500" y="714375"/>
+            <a:ext cx="7239000" cy="5429251"/>
+          </a:xfrm>
+          <a:prstGeom prst="roundRect">
+            <a:avLst/>
+          </a:prstGeom>
+          <a:noFill/>
+          <a:ln w="9525">
+            <a:noFill/>
+            <a:miter lim="800000"/>
+            <a:headEnd/>
+            <a:tailEnd/>
+          </a:ln>
+          <a:effectLst/>
+        </p:spPr>
+      </p:pic>
+    </p:spTree>
+  </p:cSld>
+  <p:clrMapOvr>
+    <a:masterClrMapping/>
+  </p:clrMapOvr>
+</p:sld>
+</file>
+
+<file path=ppt/slides/slide21.xml><?xml version="1.0" encoding="utf-8"?>
+<p:sld xmlns:a="http://schemas.openxmlformats.org/drawingml/2006/main" xmlns:r="http://schemas.openxmlformats.org/officeDocument/2006/relationships" xmlns:p="http://schemas.openxmlformats.org/presentationml/2006/main">
+  <p:cSld>
+    <p:spTree>
+      <p:nvGrpSpPr>
+        <p:cNvPr id="1" name=""/>
+        <p:cNvGrpSpPr/>
+        <p:nvPr/>
+      </p:nvGrpSpPr>
+      <p:grpSpPr>
+        <a:xfrm>
+          <a:off x="0" y="0"/>
+          <a:ext cx="0" cy="0"/>
+          <a:chOff x="0" y="0"/>
+          <a:chExt cx="0" cy="0"/>
+        </a:xfrm>
+      </p:grpSpPr>
+      <p:pic>
+        <p:nvPicPr>
           <p:cNvPr id="3077" name="Picture 5"/>
           <p:cNvPicPr>
             <a:picLocks noChangeAspect="1" noChangeArrowheads="1"/>
@@ -7669,7 +7964,7 @@
 </p:sld>
 </file>
 
-<file path=ppt/slides/slide21.xml><?xml version="1.0" encoding="utf-8"?>
+<file path=ppt/slides/slide22.xml><?xml version="1.0" encoding="utf-8"?>
 <p:sld xmlns:a="http://schemas.openxmlformats.org/drawingml/2006/main" xmlns:r="http://schemas.openxmlformats.org/officeDocument/2006/relationships" xmlns:p="http://schemas.openxmlformats.org/presentationml/2006/main">
   <p:cSld>
     <p:spTree>
@@ -7727,7 +8022,7 @@
 </p:sld>
 </file>
 
-<file path=ppt/slides/slide22.xml><?xml version="1.0" encoding="utf-8"?>
+<file path=ppt/slides/slide23.xml><?xml version="1.0" encoding="utf-8"?>
 <p:sld xmlns:a="http://schemas.openxmlformats.org/drawingml/2006/main" xmlns:r="http://schemas.openxmlformats.org/officeDocument/2006/relationships" xmlns:p="http://schemas.openxmlformats.org/presentationml/2006/main">
   <p:cSld>
     <p:spTree>
@@ -7785,7 +8080,7 @@
 </p:sld>
 </file>
 
-<file path=ppt/slides/slide23.xml><?xml version="1.0" encoding="utf-8"?>
+<file path=ppt/slides/slide24.xml><?xml version="1.0" encoding="utf-8"?>
 <p:sld xmlns:a="http://schemas.openxmlformats.org/drawingml/2006/main" xmlns:r="http://schemas.openxmlformats.org/officeDocument/2006/relationships" xmlns:p="http://schemas.openxmlformats.org/presentationml/2006/main">
   <p:cSld>
     <p:spTree>

</xml_diff>

<commit_message>
working on intro to kanban slides. got the majority of sections filled in with images and notes. starting work on metrics & beyond section
</commit_message>
<xml_diff>
--- a/Getting Started With Kanban In Software Engineering/Getting Started With Kanban.pptx
+++ b/Getting Started With Kanban In Software Engineering/Getting Started With Kanban.pptx
@@ -5,7 +5,7 @@
     <p:sldMasterId id="2147483648" r:id="rId1"/>
   </p:sldMasterIdLst>
   <p:notesMasterIdLst>
-    <p:notesMasterId r:id="rId26"/>
+    <p:notesMasterId r:id="rId31"/>
   </p:notesMasterIdLst>
   <p:sldIdLst>
     <p:sldId id="256" r:id="rId2"/>
@@ -32,6 +32,11 @@
     <p:sldId id="262" r:id="rId23"/>
     <p:sldId id="263" r:id="rId24"/>
     <p:sldId id="281" r:id="rId25"/>
+    <p:sldId id="283" r:id="rId26"/>
+    <p:sldId id="284" r:id="rId27"/>
+    <p:sldId id="285" r:id="rId28"/>
+    <p:sldId id="286" r:id="rId29"/>
+    <p:sldId id="287" r:id="rId30"/>
   </p:sldIdLst>
   <p:sldSz cx="9144000" cy="6858000" type="screen4x3"/>
   <p:notesSz cx="6858000" cy="9144000"/>
@@ -1582,6 +1587,16 @@
           </a:bodyPr>
           <a:lstStyle/>
           <a:p>
+            <a:r>
+              <a:rPr lang="en-US" dirty="0" smtClean="0"/>
+              <a:t>Pull systems – authorizing</a:t>
+            </a:r>
+            <a:r>
+              <a:rPr lang="en-US" baseline="0" dirty="0" smtClean="0"/>
+              <a:t> work based on capacity, not schedule</a:t>
+            </a:r>
+          </a:p>
+          <a:p>
             <a:endParaRPr lang="en-US" dirty="0"/>
           </a:p>
         </p:txBody>
@@ -1673,6 +1688,12 @@
               <a:rPr lang="en-US" dirty="0" smtClean="0"/>
               <a:t>Visualize your process</a:t>
             </a:r>
+          </a:p>
+          <a:p>
+            <a:r>
+              <a:rPr lang="en-US" dirty="0" smtClean="0"/>
+              <a:t>It’s your process, kanban won’t force a process on you</a:t>
+            </a:r>
             <a:endParaRPr lang="en-US" dirty="0"/>
           </a:p>
         </p:txBody>
@@ -1781,24 +1802,8 @@
             </a:pPr>
             <a:r>
               <a:rPr lang="en-US" dirty="0" smtClean="0"/>
-              <a:t>More work than time. </a:t>
-            </a:r>
-          </a:p>
-          <a:p>
-            <a:pPr eaLnBrk="1" hangingPunct="1">
-              <a:spcBef>
-                <a:spcPct val="0"/>
-              </a:spcBef>
-            </a:pPr>
-            <a:r>
-              <a:rPr lang="en-US" dirty="0" smtClean="0"/>
-              <a:t>Juggling</a:t>
-            </a:r>
-            <a:r>
-              <a:rPr lang="en-US" baseline="0" dirty="0" smtClean="0"/>
-              <a:t> too many items at once</a:t>
-            </a:r>
-            <a:endParaRPr lang="en-US" dirty="0" smtClean="0"/>
+              <a:t>More work than time</a:t>
+            </a:r>
           </a:p>
         </p:txBody>
       </p:sp>
@@ -1986,6 +1991,12 @@
               <a:rPr lang="en-US" dirty="0" smtClean="0"/>
               <a:t>Pull, don’t push</a:t>
             </a:r>
+          </a:p>
+          <a:p>
+            <a:r>
+              <a:rPr lang="en-US" dirty="0" smtClean="0"/>
+              <a:t>(run kanban simulation here)</a:t>
+            </a:r>
             <a:endParaRPr lang="en-US" dirty="0"/>
           </a:p>
         </p:txBody>
@@ -2164,10 +2175,6 @@
           </a:bodyPr>
           <a:lstStyle/>
           <a:p>
-            <a:r>
-              <a:rPr lang="en-US" dirty="0" smtClean="0"/>
-              <a:t>Kanban as a change management system</a:t>
-            </a:r>
             <a:endParaRPr lang="en-US" dirty="0"/>
           </a:p>
         </p:txBody>
@@ -2196,6 +2203,456 @@
                 <a:defRPr/>
               </a:pPr>
               <a:t>24</a:t>
+            </a:fld>
+            <a:endParaRPr lang="en-US"/>
+          </a:p>
+        </p:txBody>
+      </p:sp>
+    </p:spTree>
+  </p:cSld>
+  <p:clrMapOvr>
+    <a:masterClrMapping/>
+  </p:clrMapOvr>
+</p:notes>
+</file>
+
+<file path=ppt/notesSlides/notesSlide24.xml><?xml version="1.0" encoding="utf-8"?>
+<p:notes xmlns:a="http://schemas.openxmlformats.org/drawingml/2006/main" xmlns:r="http://schemas.openxmlformats.org/officeDocument/2006/relationships" xmlns:p="http://schemas.openxmlformats.org/presentationml/2006/main">
+  <p:cSld>
+    <p:spTree>
+      <p:nvGrpSpPr>
+        <p:cNvPr id="1" name=""/>
+        <p:cNvGrpSpPr/>
+        <p:nvPr/>
+      </p:nvGrpSpPr>
+      <p:grpSpPr>
+        <a:xfrm>
+          <a:off x="0" y="0"/>
+          <a:ext cx="0" cy="0"/>
+          <a:chOff x="0" y="0"/>
+          <a:chExt cx="0" cy="0"/>
+        </a:xfrm>
+      </p:grpSpPr>
+      <p:sp>
+        <p:nvSpPr>
+          <p:cNvPr id="2" name="Slide Image Placeholder 1"/>
+          <p:cNvSpPr>
+            <a:spLocks noGrp="1" noRot="1" noChangeAspect="1"/>
+          </p:cNvSpPr>
+          <p:nvPr>
+            <p:ph type="sldImg"/>
+          </p:nvPr>
+        </p:nvSpPr>
+        <p:spPr/>
+      </p:sp>
+      <p:sp>
+        <p:nvSpPr>
+          <p:cNvPr id="3" name="Notes Placeholder 2"/>
+          <p:cNvSpPr>
+            <a:spLocks noGrp="1"/>
+          </p:cNvSpPr>
+          <p:nvPr>
+            <p:ph type="body" idx="1"/>
+          </p:nvPr>
+        </p:nvSpPr>
+        <p:spPr/>
+        <p:txBody>
+          <a:bodyPr>
+            <a:normAutofit/>
+          </a:bodyPr>
+          <a:lstStyle/>
+          <a:p>
+            <a:r>
+              <a:rPr lang="en-US" dirty="0" smtClean="0"/>
+              <a:t>The mechanics of kanban are</a:t>
+            </a:r>
+            <a:r>
+              <a:rPr lang="en-US" baseline="0" dirty="0" smtClean="0"/>
+              <a:t> necessary but not sufficient</a:t>
+            </a:r>
+            <a:endParaRPr lang="en-US" dirty="0" smtClean="0"/>
+          </a:p>
+          <a:p>
+            <a:r>
+              <a:rPr lang="en-US" dirty="0" smtClean="0"/>
+              <a:t>Kanban as change management system</a:t>
+            </a:r>
+            <a:endParaRPr lang="en-US" dirty="0"/>
+          </a:p>
+        </p:txBody>
+      </p:sp>
+      <p:sp>
+        <p:nvSpPr>
+          <p:cNvPr id="4" name="Slide Number Placeholder 3"/>
+          <p:cNvSpPr>
+            <a:spLocks noGrp="1"/>
+          </p:cNvSpPr>
+          <p:nvPr>
+            <p:ph type="sldNum" sz="quarter" idx="10"/>
+          </p:nvPr>
+        </p:nvSpPr>
+        <p:spPr/>
+        <p:txBody>
+          <a:bodyPr/>
+          <a:lstStyle/>
+          <a:p>
+            <a:pPr>
+              <a:defRPr/>
+            </a:pPr>
+            <a:fld id="{9A28354E-8592-4F48-AFD2-064796838083}" type="slidenum">
+              <a:rPr lang="en-US" smtClean="0"/>
+              <a:pPr>
+                <a:defRPr/>
+              </a:pPr>
+              <a:t>25</a:t>
+            </a:fld>
+            <a:endParaRPr lang="en-US"/>
+          </a:p>
+        </p:txBody>
+      </p:sp>
+    </p:spTree>
+  </p:cSld>
+  <p:clrMapOvr>
+    <a:masterClrMapping/>
+  </p:clrMapOvr>
+</p:notes>
+</file>
+
+<file path=ppt/notesSlides/notesSlide25.xml><?xml version="1.0" encoding="utf-8"?>
+<p:notes xmlns:a="http://schemas.openxmlformats.org/drawingml/2006/main" xmlns:r="http://schemas.openxmlformats.org/officeDocument/2006/relationships" xmlns:p="http://schemas.openxmlformats.org/presentationml/2006/main">
+  <p:cSld>
+    <p:spTree>
+      <p:nvGrpSpPr>
+        <p:cNvPr id="1" name=""/>
+        <p:cNvGrpSpPr/>
+        <p:nvPr/>
+      </p:nvGrpSpPr>
+      <p:grpSpPr>
+        <a:xfrm>
+          <a:off x="0" y="0"/>
+          <a:ext cx="0" cy="0"/>
+          <a:chOff x="0" y="0"/>
+          <a:chExt cx="0" cy="0"/>
+        </a:xfrm>
+      </p:grpSpPr>
+      <p:sp>
+        <p:nvSpPr>
+          <p:cNvPr id="2" name="Slide Image Placeholder 1"/>
+          <p:cNvSpPr>
+            <a:spLocks noGrp="1" noRot="1" noChangeAspect="1"/>
+          </p:cNvSpPr>
+          <p:nvPr>
+            <p:ph type="sldImg"/>
+          </p:nvPr>
+        </p:nvSpPr>
+        <p:spPr/>
+      </p:sp>
+      <p:sp>
+        <p:nvSpPr>
+          <p:cNvPr id="3" name="Notes Placeholder 2"/>
+          <p:cNvSpPr>
+            <a:spLocks noGrp="1"/>
+          </p:cNvSpPr>
+          <p:nvPr>
+            <p:ph type="body" idx="1"/>
+          </p:nvPr>
+        </p:nvSpPr>
+        <p:spPr/>
+        <p:txBody>
+          <a:bodyPr>
+            <a:normAutofit/>
+          </a:bodyPr>
+          <a:lstStyle/>
+          <a:p>
+            <a:endParaRPr lang="en-US" dirty="0"/>
+          </a:p>
+        </p:txBody>
+      </p:sp>
+      <p:sp>
+        <p:nvSpPr>
+          <p:cNvPr id="4" name="Slide Number Placeholder 3"/>
+          <p:cNvSpPr>
+            <a:spLocks noGrp="1"/>
+          </p:cNvSpPr>
+          <p:nvPr>
+            <p:ph type="sldNum" sz="quarter" idx="10"/>
+          </p:nvPr>
+        </p:nvSpPr>
+        <p:spPr/>
+        <p:txBody>
+          <a:bodyPr/>
+          <a:lstStyle/>
+          <a:p>
+            <a:pPr>
+              <a:defRPr/>
+            </a:pPr>
+            <a:fld id="{9A28354E-8592-4F48-AFD2-064796838083}" type="slidenum">
+              <a:rPr lang="en-US" smtClean="0"/>
+              <a:pPr>
+                <a:defRPr/>
+              </a:pPr>
+              <a:t>26</a:t>
+            </a:fld>
+            <a:endParaRPr lang="en-US"/>
+          </a:p>
+        </p:txBody>
+      </p:sp>
+    </p:spTree>
+  </p:cSld>
+  <p:clrMapOvr>
+    <a:masterClrMapping/>
+  </p:clrMapOvr>
+</p:notes>
+</file>
+
+<file path=ppt/notesSlides/notesSlide26.xml><?xml version="1.0" encoding="utf-8"?>
+<p:notes xmlns:a="http://schemas.openxmlformats.org/drawingml/2006/main" xmlns:r="http://schemas.openxmlformats.org/officeDocument/2006/relationships" xmlns:p="http://schemas.openxmlformats.org/presentationml/2006/main">
+  <p:cSld>
+    <p:spTree>
+      <p:nvGrpSpPr>
+        <p:cNvPr id="1" name=""/>
+        <p:cNvGrpSpPr/>
+        <p:nvPr/>
+      </p:nvGrpSpPr>
+      <p:grpSpPr>
+        <a:xfrm>
+          <a:off x="0" y="0"/>
+          <a:ext cx="0" cy="0"/>
+          <a:chOff x="0" y="0"/>
+          <a:chExt cx="0" cy="0"/>
+        </a:xfrm>
+      </p:grpSpPr>
+      <p:sp>
+        <p:nvSpPr>
+          <p:cNvPr id="2" name="Slide Image Placeholder 1"/>
+          <p:cNvSpPr>
+            <a:spLocks noGrp="1" noRot="1" noChangeAspect="1"/>
+          </p:cNvSpPr>
+          <p:nvPr>
+            <p:ph type="sldImg"/>
+          </p:nvPr>
+        </p:nvSpPr>
+        <p:spPr/>
+      </p:sp>
+      <p:sp>
+        <p:nvSpPr>
+          <p:cNvPr id="3" name="Notes Placeholder 2"/>
+          <p:cNvSpPr>
+            <a:spLocks noGrp="1"/>
+          </p:cNvSpPr>
+          <p:nvPr>
+            <p:ph type="body" idx="1"/>
+          </p:nvPr>
+        </p:nvSpPr>
+        <p:spPr/>
+        <p:txBody>
+          <a:bodyPr>
+            <a:normAutofit/>
+          </a:bodyPr>
+          <a:lstStyle/>
+          <a:p>
+            <a:endParaRPr lang="en-US" dirty="0"/>
+          </a:p>
+        </p:txBody>
+      </p:sp>
+      <p:sp>
+        <p:nvSpPr>
+          <p:cNvPr id="4" name="Slide Number Placeholder 3"/>
+          <p:cNvSpPr>
+            <a:spLocks noGrp="1"/>
+          </p:cNvSpPr>
+          <p:nvPr>
+            <p:ph type="sldNum" sz="quarter" idx="10"/>
+          </p:nvPr>
+        </p:nvSpPr>
+        <p:spPr/>
+        <p:txBody>
+          <a:bodyPr/>
+          <a:lstStyle/>
+          <a:p>
+            <a:pPr>
+              <a:defRPr/>
+            </a:pPr>
+            <a:fld id="{9A28354E-8592-4F48-AFD2-064796838083}" type="slidenum">
+              <a:rPr lang="en-US" smtClean="0"/>
+              <a:pPr>
+                <a:defRPr/>
+              </a:pPr>
+              <a:t>27</a:t>
+            </a:fld>
+            <a:endParaRPr lang="en-US"/>
+          </a:p>
+        </p:txBody>
+      </p:sp>
+    </p:spTree>
+  </p:cSld>
+  <p:clrMapOvr>
+    <a:masterClrMapping/>
+  </p:clrMapOvr>
+</p:notes>
+</file>
+
+<file path=ppt/notesSlides/notesSlide27.xml><?xml version="1.0" encoding="utf-8"?>
+<p:notes xmlns:a="http://schemas.openxmlformats.org/drawingml/2006/main" xmlns:r="http://schemas.openxmlformats.org/officeDocument/2006/relationships" xmlns:p="http://schemas.openxmlformats.org/presentationml/2006/main">
+  <p:cSld>
+    <p:spTree>
+      <p:nvGrpSpPr>
+        <p:cNvPr id="1" name=""/>
+        <p:cNvGrpSpPr/>
+        <p:nvPr/>
+      </p:nvGrpSpPr>
+      <p:grpSpPr>
+        <a:xfrm>
+          <a:off x="0" y="0"/>
+          <a:ext cx="0" cy="0"/>
+          <a:chOff x="0" y="0"/>
+          <a:chExt cx="0" cy="0"/>
+        </a:xfrm>
+      </p:grpSpPr>
+      <p:sp>
+        <p:nvSpPr>
+          <p:cNvPr id="2" name="Slide Image Placeholder 1"/>
+          <p:cNvSpPr>
+            <a:spLocks noGrp="1" noRot="1" noChangeAspect="1"/>
+          </p:cNvSpPr>
+          <p:nvPr>
+            <p:ph type="sldImg"/>
+          </p:nvPr>
+        </p:nvSpPr>
+        <p:spPr/>
+      </p:sp>
+      <p:sp>
+        <p:nvSpPr>
+          <p:cNvPr id="3" name="Notes Placeholder 2"/>
+          <p:cNvSpPr>
+            <a:spLocks noGrp="1"/>
+          </p:cNvSpPr>
+          <p:nvPr>
+            <p:ph type="body" idx="1"/>
+          </p:nvPr>
+        </p:nvSpPr>
+        <p:spPr/>
+        <p:txBody>
+          <a:bodyPr>
+            <a:normAutofit/>
+          </a:bodyPr>
+          <a:lstStyle/>
+          <a:p>
+            <a:endParaRPr lang="en-US" dirty="0"/>
+          </a:p>
+        </p:txBody>
+      </p:sp>
+      <p:sp>
+        <p:nvSpPr>
+          <p:cNvPr id="4" name="Slide Number Placeholder 3"/>
+          <p:cNvSpPr>
+            <a:spLocks noGrp="1"/>
+          </p:cNvSpPr>
+          <p:nvPr>
+            <p:ph type="sldNum" sz="quarter" idx="10"/>
+          </p:nvPr>
+        </p:nvSpPr>
+        <p:spPr/>
+        <p:txBody>
+          <a:bodyPr/>
+          <a:lstStyle/>
+          <a:p>
+            <a:pPr>
+              <a:defRPr/>
+            </a:pPr>
+            <a:fld id="{9A28354E-8592-4F48-AFD2-064796838083}" type="slidenum">
+              <a:rPr lang="en-US" smtClean="0"/>
+              <a:pPr>
+                <a:defRPr/>
+              </a:pPr>
+              <a:t>28</a:t>
+            </a:fld>
+            <a:endParaRPr lang="en-US"/>
+          </a:p>
+        </p:txBody>
+      </p:sp>
+    </p:spTree>
+  </p:cSld>
+  <p:clrMapOvr>
+    <a:masterClrMapping/>
+  </p:clrMapOvr>
+</p:notes>
+</file>
+
+<file path=ppt/notesSlides/notesSlide28.xml><?xml version="1.0" encoding="utf-8"?>
+<p:notes xmlns:a="http://schemas.openxmlformats.org/drawingml/2006/main" xmlns:r="http://schemas.openxmlformats.org/officeDocument/2006/relationships" xmlns:p="http://schemas.openxmlformats.org/presentationml/2006/main">
+  <p:cSld>
+    <p:spTree>
+      <p:nvGrpSpPr>
+        <p:cNvPr id="1" name=""/>
+        <p:cNvGrpSpPr/>
+        <p:nvPr/>
+      </p:nvGrpSpPr>
+      <p:grpSpPr>
+        <a:xfrm>
+          <a:off x="0" y="0"/>
+          <a:ext cx="0" cy="0"/>
+          <a:chOff x="0" y="0"/>
+          <a:chExt cx="0" cy="0"/>
+        </a:xfrm>
+      </p:grpSpPr>
+      <p:sp>
+        <p:nvSpPr>
+          <p:cNvPr id="2" name="Slide Image Placeholder 1"/>
+          <p:cNvSpPr>
+            <a:spLocks noGrp="1" noRot="1" noChangeAspect="1"/>
+          </p:cNvSpPr>
+          <p:nvPr>
+            <p:ph type="sldImg"/>
+          </p:nvPr>
+        </p:nvSpPr>
+        <p:spPr/>
+      </p:sp>
+      <p:sp>
+        <p:nvSpPr>
+          <p:cNvPr id="3" name="Notes Placeholder 2"/>
+          <p:cNvSpPr>
+            <a:spLocks noGrp="1"/>
+          </p:cNvSpPr>
+          <p:nvPr>
+            <p:ph type="body" idx="1"/>
+          </p:nvPr>
+        </p:nvSpPr>
+        <p:spPr/>
+        <p:txBody>
+          <a:bodyPr>
+            <a:normAutofit/>
+          </a:bodyPr>
+          <a:lstStyle/>
+          <a:p>
+            <a:endParaRPr lang="en-US" dirty="0"/>
+          </a:p>
+        </p:txBody>
+      </p:sp>
+      <p:sp>
+        <p:nvSpPr>
+          <p:cNvPr id="4" name="Slide Number Placeholder 3"/>
+          <p:cNvSpPr>
+            <a:spLocks noGrp="1"/>
+          </p:cNvSpPr>
+          <p:nvPr>
+            <p:ph type="sldNum" sz="quarter" idx="10"/>
+          </p:nvPr>
+        </p:nvSpPr>
+        <p:spPr/>
+        <p:txBody>
+          <a:bodyPr/>
+          <a:lstStyle/>
+          <a:p>
+            <a:pPr>
+              <a:defRPr/>
+            </a:pPr>
+            <a:fld id="{9A28354E-8592-4F48-AFD2-064796838083}" type="slidenum">
+              <a:rPr lang="en-US" smtClean="0"/>
+              <a:pPr>
+                <a:defRPr/>
+              </a:pPr>
+              <a:t>29</a:t>
             </a:fld>
             <a:endParaRPr lang="en-US"/>
           </a:p>
@@ -7682,6 +8139,39 @@
           <a:chExt cx="0" cy="0"/>
         </a:xfrm>
       </p:grpSpPr>
+      <p:pic>
+        <p:nvPicPr>
+          <p:cNvPr id="5" name="Picture 3"/>
+          <p:cNvPicPr>
+            <a:picLocks noChangeAspect="1" noChangeArrowheads="1"/>
+          </p:cNvPicPr>
+          <p:nvPr/>
+        </p:nvPicPr>
+        <p:blipFill>
+          <a:blip r:embed="rId3"/>
+          <a:srcRect/>
+          <a:stretch>
+            <a:fillRect/>
+          </a:stretch>
+        </p:blipFill>
+        <p:spPr bwMode="auto">
+          <a:xfrm>
+            <a:off x="990600" y="742950"/>
+            <a:ext cx="7162800" cy="5372101"/>
+          </a:xfrm>
+          <a:prstGeom prst="roundRect">
+            <a:avLst/>
+          </a:prstGeom>
+          <a:noFill/>
+          <a:ln w="9525">
+            <a:noFill/>
+            <a:miter lim="800000"/>
+            <a:headEnd/>
+            <a:tailEnd/>
+          </a:ln>
+          <a:effectLst/>
+        </p:spPr>
+      </p:pic>
     </p:spTree>
   </p:cSld>
   <p:clrMapOvr>
@@ -7867,7 +8357,7 @@
       </p:grpSpPr>
       <p:pic>
         <p:nvPicPr>
-          <p:cNvPr id="6146" name="Picture 2"/>
+          <p:cNvPr id="12294" name="Picture 6"/>
           <p:cNvPicPr>
             <a:picLocks noChangeAspect="1" noChangeArrowheads="1"/>
           </p:cNvPicPr>
@@ -7882,8 +8372,8 @@
         </p:blipFill>
         <p:spPr bwMode="auto">
           <a:xfrm>
-            <a:off x="952500" y="714375"/>
-            <a:ext cx="7239000" cy="5429251"/>
+            <a:off x="990600" y="818348"/>
+            <a:ext cx="7162800" cy="5221305"/>
           </a:xfrm>
           <a:prstGeom prst="roundRect">
             <a:avLst/>
@@ -7925,7 +8415,7 @@
       </p:grpSpPr>
       <p:pic>
         <p:nvPicPr>
-          <p:cNvPr id="3077" name="Picture 5"/>
+          <p:cNvPr id="5" name="Picture 5"/>
           <p:cNvPicPr>
             <a:picLocks noChangeAspect="1" noChangeArrowheads="1"/>
           </p:cNvPicPr>
@@ -7940,8 +8430,8 @@
         </p:blipFill>
         <p:spPr bwMode="auto">
           <a:xfrm>
-            <a:off x="834435" y="940569"/>
-            <a:ext cx="7475130" cy="4976863"/>
+            <a:off x="990601" y="1044542"/>
+            <a:ext cx="7162799" cy="4768916"/>
           </a:xfrm>
           <a:prstGeom prst="roundRect">
             <a:avLst/>
@@ -7983,7 +8473,7 @@
       </p:grpSpPr>
       <p:pic>
         <p:nvPicPr>
-          <p:cNvPr id="7171" name="Picture 3"/>
+          <p:cNvPr id="7" name="Picture 3"/>
           <p:cNvPicPr>
             <a:picLocks noChangeAspect="1" noChangeArrowheads="1"/>
           </p:cNvPicPr>
@@ -7998,8 +8488,8 @@
         </p:blipFill>
         <p:spPr bwMode="auto">
           <a:xfrm>
-            <a:off x="1138481" y="1143000"/>
-            <a:ext cx="6938719" cy="4619726"/>
+            <a:off x="985932" y="1041434"/>
+            <a:ext cx="7172137" cy="4775133"/>
           </a:xfrm>
           <a:prstGeom prst="roundRect">
             <a:avLst/>
@@ -8041,7 +8531,7 @@
       </p:grpSpPr>
       <p:pic>
         <p:nvPicPr>
-          <p:cNvPr id="8194" name="Picture 2"/>
+          <p:cNvPr id="6" name="Picture 2"/>
           <p:cNvPicPr>
             <a:picLocks noChangeAspect="1" noChangeArrowheads="1"/>
           </p:cNvPicPr>
@@ -8056,8 +8546,8 @@
         </p:blipFill>
         <p:spPr bwMode="auto">
           <a:xfrm>
-            <a:off x="1600200" y="457200"/>
-            <a:ext cx="5867400" cy="5867400"/>
+            <a:off x="997058" y="916379"/>
+            <a:ext cx="7149885" cy="5025242"/>
           </a:xfrm>
           <a:prstGeom prst="roundRect">
             <a:avLst/>
@@ -8154,6 +8644,197 @@
           </a:p>
         </p:txBody>
       </p:sp>
+      <p:pic>
+        <p:nvPicPr>
+          <p:cNvPr id="4" name="Picture 2"/>
+          <p:cNvPicPr>
+            <a:picLocks noChangeAspect="1" noChangeArrowheads="1"/>
+          </p:cNvPicPr>
+          <p:nvPr/>
+        </p:nvPicPr>
+        <p:blipFill>
+          <a:blip r:embed="rId3"/>
+          <a:srcRect/>
+          <a:stretch>
+            <a:fillRect/>
+          </a:stretch>
+        </p:blipFill>
+        <p:spPr bwMode="auto">
+          <a:xfrm>
+            <a:off x="990600" y="1479483"/>
+            <a:ext cx="7162800" cy="4768917"/>
+          </a:xfrm>
+          <a:prstGeom prst="roundRect">
+            <a:avLst/>
+          </a:prstGeom>
+          <a:noFill/>
+          <a:ln w="9525">
+            <a:noFill/>
+            <a:miter lim="800000"/>
+            <a:headEnd/>
+            <a:tailEnd/>
+          </a:ln>
+          <a:effectLst/>
+        </p:spPr>
+      </p:pic>
+    </p:spTree>
+  </p:cSld>
+  <p:clrMapOvr>
+    <a:masterClrMapping/>
+  </p:clrMapOvr>
+</p:sld>
+</file>
+
+<file path=ppt/slides/slide25.xml><?xml version="1.0" encoding="utf-8"?>
+<p:sld xmlns:a="http://schemas.openxmlformats.org/drawingml/2006/main" xmlns:r="http://schemas.openxmlformats.org/officeDocument/2006/relationships" xmlns:p="http://schemas.openxmlformats.org/presentationml/2006/main">
+  <p:cSld>
+    <p:spTree>
+      <p:nvGrpSpPr>
+        <p:cNvPr id="1" name=""/>
+        <p:cNvGrpSpPr/>
+        <p:nvPr/>
+      </p:nvGrpSpPr>
+      <p:grpSpPr>
+        <a:xfrm>
+          <a:off x="0" y="0"/>
+          <a:ext cx="0" cy="0"/>
+          <a:chOff x="0" y="0"/>
+          <a:chExt cx="0" cy="0"/>
+        </a:xfrm>
+      </p:grpSpPr>
+      <p:pic>
+        <p:nvPicPr>
+          <p:cNvPr id="5" name="Picture 3"/>
+          <p:cNvPicPr>
+            <a:picLocks noChangeAspect="1" noChangeArrowheads="1"/>
+          </p:cNvPicPr>
+          <p:nvPr/>
+        </p:nvPicPr>
+        <p:blipFill>
+          <a:blip r:embed="rId3"/>
+          <a:srcRect/>
+          <a:stretch>
+            <a:fillRect/>
+          </a:stretch>
+        </p:blipFill>
+        <p:spPr bwMode="auto">
+          <a:xfrm>
+            <a:off x="990600" y="1053966"/>
+            <a:ext cx="7162800" cy="4750068"/>
+          </a:xfrm>
+          <a:prstGeom prst="roundRect">
+            <a:avLst/>
+          </a:prstGeom>
+          <a:noFill/>
+          <a:ln w="9525">
+            <a:noFill/>
+            <a:miter lim="800000"/>
+            <a:headEnd/>
+            <a:tailEnd/>
+          </a:ln>
+          <a:effectLst/>
+        </p:spPr>
+      </p:pic>
+    </p:spTree>
+  </p:cSld>
+  <p:clrMapOvr>
+    <a:masterClrMapping/>
+  </p:clrMapOvr>
+</p:sld>
+</file>
+
+<file path=ppt/slides/slide26.xml><?xml version="1.0" encoding="utf-8"?>
+<p:sld xmlns:a="http://schemas.openxmlformats.org/drawingml/2006/main" xmlns:r="http://schemas.openxmlformats.org/officeDocument/2006/relationships" xmlns:p="http://schemas.openxmlformats.org/presentationml/2006/main">
+  <p:cSld>
+    <p:spTree>
+      <p:nvGrpSpPr>
+        <p:cNvPr id="1" name=""/>
+        <p:cNvGrpSpPr/>
+        <p:nvPr/>
+      </p:nvGrpSpPr>
+      <p:grpSpPr>
+        <a:xfrm>
+          <a:off x="0" y="0"/>
+          <a:ext cx="0" cy="0"/>
+          <a:chOff x="0" y="0"/>
+          <a:chExt cx="0" cy="0"/>
+        </a:xfrm>
+      </p:grpSpPr>
+    </p:spTree>
+  </p:cSld>
+  <p:clrMapOvr>
+    <a:masterClrMapping/>
+  </p:clrMapOvr>
+</p:sld>
+</file>
+
+<file path=ppt/slides/slide27.xml><?xml version="1.0" encoding="utf-8"?>
+<p:sld xmlns:a="http://schemas.openxmlformats.org/drawingml/2006/main" xmlns:r="http://schemas.openxmlformats.org/officeDocument/2006/relationships" xmlns:p="http://schemas.openxmlformats.org/presentationml/2006/main">
+  <p:cSld>
+    <p:spTree>
+      <p:nvGrpSpPr>
+        <p:cNvPr id="1" name=""/>
+        <p:cNvGrpSpPr/>
+        <p:nvPr/>
+      </p:nvGrpSpPr>
+      <p:grpSpPr>
+        <a:xfrm>
+          <a:off x="0" y="0"/>
+          <a:ext cx="0" cy="0"/>
+          <a:chOff x="0" y="0"/>
+          <a:chExt cx="0" cy="0"/>
+        </a:xfrm>
+      </p:grpSpPr>
+    </p:spTree>
+  </p:cSld>
+  <p:clrMapOvr>
+    <a:masterClrMapping/>
+  </p:clrMapOvr>
+</p:sld>
+</file>
+
+<file path=ppt/slides/slide28.xml><?xml version="1.0" encoding="utf-8"?>
+<p:sld xmlns:a="http://schemas.openxmlformats.org/drawingml/2006/main" xmlns:r="http://schemas.openxmlformats.org/officeDocument/2006/relationships" xmlns:p="http://schemas.openxmlformats.org/presentationml/2006/main">
+  <p:cSld>
+    <p:spTree>
+      <p:nvGrpSpPr>
+        <p:cNvPr id="1" name=""/>
+        <p:cNvGrpSpPr/>
+        <p:nvPr/>
+      </p:nvGrpSpPr>
+      <p:grpSpPr>
+        <a:xfrm>
+          <a:off x="0" y="0"/>
+          <a:ext cx="0" cy="0"/>
+          <a:chOff x="0" y="0"/>
+          <a:chExt cx="0" cy="0"/>
+        </a:xfrm>
+      </p:grpSpPr>
+    </p:spTree>
+  </p:cSld>
+  <p:clrMapOvr>
+    <a:masterClrMapping/>
+  </p:clrMapOvr>
+</p:sld>
+</file>
+
+<file path=ppt/slides/slide29.xml><?xml version="1.0" encoding="utf-8"?>
+<p:sld xmlns:a="http://schemas.openxmlformats.org/drawingml/2006/main" xmlns:r="http://schemas.openxmlformats.org/officeDocument/2006/relationships" xmlns:p="http://schemas.openxmlformats.org/presentationml/2006/main">
+  <p:cSld>
+    <p:spTree>
+      <p:nvGrpSpPr>
+        <p:cNvPr id="1" name=""/>
+        <p:cNvGrpSpPr/>
+        <p:nvPr/>
+      </p:nvGrpSpPr>
+      <p:grpSpPr>
+        <a:xfrm>
+          <a:off x="0" y="0"/>
+          <a:ext cx="0" cy="0"/>
+          <a:chOff x="0" y="0"/>
+          <a:chExt cx="0" cy="0"/>
+        </a:xfrm>
+      </p:grpSpPr>
     </p:spTree>
   </p:cSld>
   <p:clrMapOvr>

</xml_diff>